<commit_message>
Update changes, 14 Apr 2022, FA.
</commit_message>
<xml_diff>
--- a/MATLAB Codes/Results/Results.pptx
+++ b/MATLAB Codes/Results/Results.pptx
@@ -6,6 +6,10 @@
   </p:sldMasterIdLst>
   <p:sldIdLst>
     <p:sldId id="256" r:id="rId2"/>
+    <p:sldId id="259" r:id="rId3"/>
+    <p:sldId id="260" r:id="rId4"/>
+    <p:sldId id="257" r:id="rId5"/>
+    <p:sldId id="258" r:id="rId6"/>
   </p:sldIdLst>
   <p:sldSz cx="12192000" cy="6858000"/>
   <p:notesSz cx="6858000" cy="9144000"/>
@@ -115,14 +119,273 @@
 <file path=ppt/revisionInfo.xml><?xml version="1.0" encoding="utf-8"?>
 <p1510:revInfo xmlns:a="http://schemas.openxmlformats.org/drawingml/2006/main" xmlns:r="http://schemas.openxmlformats.org/officeDocument/2006/relationships" xmlns:p1510="http://schemas.microsoft.com/office/powerpoint/2015/10/main">
   <p1510:revLst>
-    <p1510:client id="{D6AC5A0F-AC28-4C16-82D2-252B3D714B86}" v="1" dt="2022-03-18T19:06:09.198"/>
-    <p1510:client id="{DC0A64D6-2C76-4C7B-9FD9-5E1DDAF0783A}" v="3" dt="2022-03-18T19:05:03.262"/>
+    <p1510:client id="{D0B3A3F1-4C1C-48C4-A1DA-EE8A7114DFAF}" v="21" dt="2022-04-13T19:32:12.681"/>
   </p1510:revLst>
 </p1510:revInfo>
 </file>
 
 <file path=ppt/changesInfos/changesInfo1.xml><?xml version="1.0" encoding="utf-8"?>
 <pc:chgInfo xmlns:a="http://schemas.openxmlformats.org/drawingml/2006/main" xmlns:r="http://schemas.openxmlformats.org/officeDocument/2006/relationships" xmlns:ac="http://schemas.microsoft.com/office/drawing/2013/main/command" xmlns:pc="http://schemas.microsoft.com/office/powerpoint/2013/main/command">
+  <pc:docChgLst>
+    <pc:chgData name="Firnaaz Ahamed" userId="354af85a-496a-464c-a30e-ea50a64145d9" providerId="ADAL" clId="{D0B3A3F1-4C1C-48C4-A1DA-EE8A7114DFAF}"/>
+    <pc:docChg chg="undo custSel addSld modSld">
+      <pc:chgData name="Firnaaz Ahamed" userId="354af85a-496a-464c-a30e-ea50a64145d9" providerId="ADAL" clId="{D0B3A3F1-4C1C-48C4-A1DA-EE8A7114DFAF}" dt="2022-04-13T19:51:32.783" v="345" actId="2166"/>
+      <pc:docMkLst>
+        <pc:docMk/>
+      </pc:docMkLst>
+      <pc:sldChg chg="addSp delSp modSp mod">
+        <pc:chgData name="Firnaaz Ahamed" userId="354af85a-496a-464c-a30e-ea50a64145d9" providerId="ADAL" clId="{D0B3A3F1-4C1C-48C4-A1DA-EE8A7114DFAF}" dt="2022-04-13T16:57:50.825" v="163" actId="1076"/>
+        <pc:sldMkLst>
+          <pc:docMk/>
+          <pc:sldMk cId="1258212438" sldId="256"/>
+        </pc:sldMkLst>
+        <pc:spChg chg="add mod">
+          <ac:chgData name="Firnaaz Ahamed" userId="354af85a-496a-464c-a30e-ea50a64145d9" providerId="ADAL" clId="{D0B3A3F1-4C1C-48C4-A1DA-EE8A7114DFAF}" dt="2022-04-13T16:46:52.404" v="149" actId="1076"/>
+          <ac:spMkLst>
+            <pc:docMk/>
+            <pc:sldMk cId="1258212438" sldId="256"/>
+            <ac:spMk id="4" creationId="{0CBE1CC4-09BD-43CB-A4FE-D0963FFCD536}"/>
+          </ac:spMkLst>
+        </pc:spChg>
+        <pc:spChg chg="add del mod">
+          <ac:chgData name="Firnaaz Ahamed" userId="354af85a-496a-464c-a30e-ea50a64145d9" providerId="ADAL" clId="{D0B3A3F1-4C1C-48C4-A1DA-EE8A7114DFAF}" dt="2022-04-13T14:32:25.528" v="114" actId="478"/>
+          <ac:spMkLst>
+            <pc:docMk/>
+            <pc:sldMk cId="1258212438" sldId="256"/>
+            <ac:spMk id="5" creationId="{AB16D557-012A-4C40-8595-AD9E3B7B0486}"/>
+          </ac:spMkLst>
+        </pc:spChg>
+        <pc:spChg chg="add mod">
+          <ac:chgData name="Firnaaz Ahamed" userId="354af85a-496a-464c-a30e-ea50a64145d9" providerId="ADAL" clId="{D0B3A3F1-4C1C-48C4-A1DA-EE8A7114DFAF}" dt="2022-04-13T16:57:40.998" v="160" actId="20577"/>
+          <ac:spMkLst>
+            <pc:docMk/>
+            <pc:sldMk cId="1258212438" sldId="256"/>
+            <ac:spMk id="7" creationId="{D558D364-B7B6-413B-A108-862244962CE7}"/>
+          </ac:spMkLst>
+        </pc:spChg>
+        <pc:spChg chg="add del mod">
+          <ac:chgData name="Firnaaz Ahamed" userId="354af85a-496a-464c-a30e-ea50a64145d9" providerId="ADAL" clId="{D0B3A3F1-4C1C-48C4-A1DA-EE8A7114DFAF}" dt="2022-04-12T21:42:33.832" v="111" actId="478"/>
+          <ac:spMkLst>
+            <pc:docMk/>
+            <pc:sldMk cId="1258212438" sldId="256"/>
+            <ac:spMk id="8" creationId="{6E3A3BA4-6765-4281-8B86-61DBB8899374}"/>
+          </ac:spMkLst>
+        </pc:spChg>
+        <pc:spChg chg="add mod">
+          <ac:chgData name="Firnaaz Ahamed" userId="354af85a-496a-464c-a30e-ea50a64145d9" providerId="ADAL" clId="{D0B3A3F1-4C1C-48C4-A1DA-EE8A7114DFAF}" dt="2022-04-13T16:57:44.686" v="161" actId="20577"/>
+          <ac:spMkLst>
+            <pc:docMk/>
+            <pc:sldMk cId="1258212438" sldId="256"/>
+            <ac:spMk id="8" creationId="{B5B1E913-809A-4519-93D2-31EF6FEE5918}"/>
+          </ac:spMkLst>
+        </pc:spChg>
+        <pc:spChg chg="add mod">
+          <ac:chgData name="Firnaaz Ahamed" userId="354af85a-496a-464c-a30e-ea50a64145d9" providerId="ADAL" clId="{D0B3A3F1-4C1C-48C4-A1DA-EE8A7114DFAF}" dt="2022-04-13T16:57:50.825" v="163" actId="1076"/>
+          <ac:spMkLst>
+            <pc:docMk/>
+            <pc:sldMk cId="1258212438" sldId="256"/>
+            <ac:spMk id="9" creationId="{85C91981-72A9-4518-8CA0-98402A8E59F8}"/>
+          </ac:spMkLst>
+        </pc:spChg>
+        <pc:picChg chg="del">
+          <ac:chgData name="Firnaaz Ahamed" userId="354af85a-496a-464c-a30e-ea50a64145d9" providerId="ADAL" clId="{D0B3A3F1-4C1C-48C4-A1DA-EE8A7114DFAF}" dt="2022-04-12T20:52:00.096" v="70" actId="478"/>
+          <ac:picMkLst>
+            <pc:docMk/>
+            <pc:sldMk cId="1258212438" sldId="256"/>
+            <ac:picMk id="3" creationId="{854B92A7-1E1A-446E-A24C-647BB0037F52}"/>
+          </ac:picMkLst>
+        </pc:picChg>
+        <pc:picChg chg="add mod">
+          <ac:chgData name="Firnaaz Ahamed" userId="354af85a-496a-464c-a30e-ea50a64145d9" providerId="ADAL" clId="{D0B3A3F1-4C1C-48C4-A1DA-EE8A7114DFAF}" dt="2022-04-13T16:46:36.469" v="144" actId="1076"/>
+          <ac:picMkLst>
+            <pc:docMk/>
+            <pc:sldMk cId="1258212438" sldId="256"/>
+            <ac:picMk id="5" creationId="{F302EABB-32B8-429C-A4D2-D0654BBDB0B6}"/>
+          </ac:picMkLst>
+        </pc:picChg>
+        <pc:picChg chg="add mod ord">
+          <ac:chgData name="Firnaaz Ahamed" userId="354af85a-496a-464c-a30e-ea50a64145d9" providerId="ADAL" clId="{D0B3A3F1-4C1C-48C4-A1DA-EE8A7114DFAF}" dt="2022-04-13T16:46:29.139" v="140" actId="1076"/>
+          <ac:picMkLst>
+            <pc:docMk/>
+            <pc:sldMk cId="1258212438" sldId="256"/>
+            <ac:picMk id="6" creationId="{3F7C45EF-DDC7-4322-A14E-2CE9BEE1B6A7}"/>
+          </ac:picMkLst>
+        </pc:picChg>
+      </pc:sldChg>
+      <pc:sldChg chg="addSp delSp modSp new mod">
+        <pc:chgData name="Firnaaz Ahamed" userId="354af85a-496a-464c-a30e-ea50a64145d9" providerId="ADAL" clId="{D0B3A3F1-4C1C-48C4-A1DA-EE8A7114DFAF}" dt="2022-04-12T21:35:43.241" v="85" actId="1076"/>
+        <pc:sldMkLst>
+          <pc:docMk/>
+          <pc:sldMk cId="2989943056" sldId="257"/>
+        </pc:sldMkLst>
+        <pc:picChg chg="add mod">
+          <ac:chgData name="Firnaaz Ahamed" userId="354af85a-496a-464c-a30e-ea50a64145d9" providerId="ADAL" clId="{D0B3A3F1-4C1C-48C4-A1DA-EE8A7114DFAF}" dt="2022-04-12T21:35:43.241" v="85" actId="1076"/>
+          <ac:picMkLst>
+            <pc:docMk/>
+            <pc:sldMk cId="2989943056" sldId="257"/>
+            <ac:picMk id="3" creationId="{DA92C271-BD18-4E0C-91E8-0DD8733B095E}"/>
+          </ac:picMkLst>
+        </pc:picChg>
+        <pc:picChg chg="add del mod">
+          <ac:chgData name="Firnaaz Ahamed" userId="354af85a-496a-464c-a30e-ea50a64145d9" providerId="ADAL" clId="{D0B3A3F1-4C1C-48C4-A1DA-EE8A7114DFAF}" dt="2022-04-12T21:35:39.721" v="84" actId="478"/>
+          <ac:picMkLst>
+            <pc:docMk/>
+            <pc:sldMk cId="2989943056" sldId="257"/>
+            <ac:picMk id="5" creationId="{003ADA69-EB9E-4B24-9C15-E076582A8C00}"/>
+          </ac:picMkLst>
+        </pc:picChg>
+      </pc:sldChg>
+      <pc:sldChg chg="delSp modSp add mod">
+        <pc:chgData name="Firnaaz Ahamed" userId="354af85a-496a-464c-a30e-ea50a64145d9" providerId="ADAL" clId="{D0B3A3F1-4C1C-48C4-A1DA-EE8A7114DFAF}" dt="2022-04-12T21:35:46.759" v="87" actId="1076"/>
+        <pc:sldMkLst>
+          <pc:docMk/>
+          <pc:sldMk cId="354323073" sldId="258"/>
+        </pc:sldMkLst>
+        <pc:picChg chg="del">
+          <ac:chgData name="Firnaaz Ahamed" userId="354af85a-496a-464c-a30e-ea50a64145d9" providerId="ADAL" clId="{D0B3A3F1-4C1C-48C4-A1DA-EE8A7114DFAF}" dt="2022-04-12T21:35:44.493" v="86" actId="478"/>
+          <ac:picMkLst>
+            <pc:docMk/>
+            <pc:sldMk cId="354323073" sldId="258"/>
+            <ac:picMk id="3" creationId="{DA92C271-BD18-4E0C-91E8-0DD8733B095E}"/>
+          </ac:picMkLst>
+        </pc:picChg>
+        <pc:picChg chg="mod">
+          <ac:chgData name="Firnaaz Ahamed" userId="354af85a-496a-464c-a30e-ea50a64145d9" providerId="ADAL" clId="{D0B3A3F1-4C1C-48C4-A1DA-EE8A7114DFAF}" dt="2022-04-12T21:35:46.759" v="87" actId="1076"/>
+          <ac:picMkLst>
+            <pc:docMk/>
+            <pc:sldMk cId="354323073" sldId="258"/>
+            <ac:picMk id="5" creationId="{003ADA69-EB9E-4B24-9C15-E076582A8C00}"/>
+          </ac:picMkLst>
+        </pc:picChg>
+      </pc:sldChg>
+      <pc:sldChg chg="addSp delSp modSp add mod">
+        <pc:chgData name="Firnaaz Ahamed" userId="354af85a-496a-464c-a30e-ea50a64145d9" providerId="ADAL" clId="{D0B3A3F1-4C1C-48C4-A1DA-EE8A7114DFAF}" dt="2022-04-13T17:16:26.631" v="198" actId="1076"/>
+        <pc:sldMkLst>
+          <pc:docMk/>
+          <pc:sldMk cId="4230192189" sldId="259"/>
+        </pc:sldMkLst>
+        <pc:spChg chg="del">
+          <ac:chgData name="Firnaaz Ahamed" userId="354af85a-496a-464c-a30e-ea50a64145d9" providerId="ADAL" clId="{D0B3A3F1-4C1C-48C4-A1DA-EE8A7114DFAF}" dt="2022-04-13T16:46:56.698" v="150" actId="478"/>
+          <ac:spMkLst>
+            <pc:docMk/>
+            <pc:sldMk cId="4230192189" sldId="259"/>
+            <ac:spMk id="4" creationId="{0CBE1CC4-09BD-43CB-A4FE-D0963FFCD536}"/>
+          </ac:spMkLst>
+        </pc:spChg>
+        <pc:spChg chg="del mod">
+          <ac:chgData name="Firnaaz Ahamed" userId="354af85a-496a-464c-a30e-ea50a64145d9" providerId="ADAL" clId="{D0B3A3F1-4C1C-48C4-A1DA-EE8A7114DFAF}" dt="2022-04-13T16:46:41.101" v="146" actId="21"/>
+          <ac:spMkLst>
+            <pc:docMk/>
+            <pc:sldMk cId="4230192189" sldId="259"/>
+            <ac:spMk id="7" creationId="{D558D364-B7B6-413B-A108-862244962CE7}"/>
+          </ac:spMkLst>
+        </pc:spChg>
+        <pc:spChg chg="add mod">
+          <ac:chgData name="Firnaaz Ahamed" userId="354af85a-496a-464c-a30e-ea50a64145d9" providerId="ADAL" clId="{D0B3A3F1-4C1C-48C4-A1DA-EE8A7114DFAF}" dt="2022-04-13T16:58:04.585" v="189" actId="14100"/>
+          <ac:spMkLst>
+            <pc:docMk/>
+            <pc:sldMk cId="4230192189" sldId="259"/>
+            <ac:spMk id="8" creationId="{107494D4-EDD0-41BB-8B40-E84A2E5B83FF}"/>
+          </ac:spMkLst>
+        </pc:spChg>
+        <pc:spChg chg="add mod">
+          <ac:chgData name="Firnaaz Ahamed" userId="354af85a-496a-464c-a30e-ea50a64145d9" providerId="ADAL" clId="{D0B3A3F1-4C1C-48C4-A1DA-EE8A7114DFAF}" dt="2022-04-13T16:58:14.011" v="192" actId="1076"/>
+          <ac:spMkLst>
+            <pc:docMk/>
+            <pc:sldMk cId="4230192189" sldId="259"/>
+            <ac:spMk id="9" creationId="{E1B332DC-B978-4BEC-B49E-AE4FB991C836}"/>
+          </ac:spMkLst>
+        </pc:spChg>
+        <pc:spChg chg="add mod">
+          <ac:chgData name="Firnaaz Ahamed" userId="354af85a-496a-464c-a30e-ea50a64145d9" providerId="ADAL" clId="{D0B3A3F1-4C1C-48C4-A1DA-EE8A7114DFAF}" dt="2022-04-13T16:58:12.362" v="191" actId="1076"/>
+          <ac:spMkLst>
+            <pc:docMk/>
+            <pc:sldMk cId="4230192189" sldId="259"/>
+            <ac:spMk id="10" creationId="{E481DD45-42F4-45C9-9E1C-BA4DB9E6C3AB}"/>
+          </ac:spMkLst>
+        </pc:spChg>
+        <pc:picChg chg="add del mod ord">
+          <ac:chgData name="Firnaaz Ahamed" userId="354af85a-496a-464c-a30e-ea50a64145d9" providerId="ADAL" clId="{D0B3A3F1-4C1C-48C4-A1DA-EE8A7114DFAF}" dt="2022-04-13T16:46:30.843" v="141" actId="21"/>
+          <ac:picMkLst>
+            <pc:docMk/>
+            <pc:sldMk cId="4230192189" sldId="259"/>
+            <ac:picMk id="3" creationId="{F6BF0F04-FFD7-402E-8298-E0992723AE35}"/>
+          </ac:picMkLst>
+        </pc:picChg>
+        <pc:picChg chg="add mod">
+          <ac:chgData name="Firnaaz Ahamed" userId="354af85a-496a-464c-a30e-ea50a64145d9" providerId="ADAL" clId="{D0B3A3F1-4C1C-48C4-A1DA-EE8A7114DFAF}" dt="2022-04-13T16:57:32.693" v="156" actId="14100"/>
+          <ac:picMkLst>
+            <pc:docMk/>
+            <pc:sldMk cId="4230192189" sldId="259"/>
+            <ac:picMk id="5" creationId="{446B9B14-3049-49AB-804F-689A0AEC5823}"/>
+          </ac:picMkLst>
+        </pc:picChg>
+        <pc:picChg chg="del">
+          <ac:chgData name="Firnaaz Ahamed" userId="354af85a-496a-464c-a30e-ea50a64145d9" providerId="ADAL" clId="{D0B3A3F1-4C1C-48C4-A1DA-EE8A7114DFAF}" dt="2022-04-13T14:32:30.447" v="116" actId="478"/>
+          <ac:picMkLst>
+            <pc:docMk/>
+            <pc:sldMk cId="4230192189" sldId="259"/>
+            <ac:picMk id="6" creationId="{3F7C45EF-DDC7-4322-A14E-2CE9BEE1B6A7}"/>
+          </ac:picMkLst>
+        </pc:picChg>
+        <pc:picChg chg="add del mod">
+          <ac:chgData name="Firnaaz Ahamed" userId="354af85a-496a-464c-a30e-ea50a64145d9" providerId="ADAL" clId="{D0B3A3F1-4C1C-48C4-A1DA-EE8A7114DFAF}" dt="2022-04-13T14:34:34.740" v="136"/>
+          <ac:picMkLst>
+            <pc:docMk/>
+            <pc:sldMk cId="4230192189" sldId="259"/>
+            <ac:picMk id="8" creationId="{E7DE7D18-D0BF-4B03-8968-3A5FD886AE11}"/>
+          </ac:picMkLst>
+        </pc:picChg>
+        <pc:picChg chg="add mod">
+          <ac:chgData name="Firnaaz Ahamed" userId="354af85a-496a-464c-a30e-ea50a64145d9" providerId="ADAL" clId="{D0B3A3F1-4C1C-48C4-A1DA-EE8A7114DFAF}" dt="2022-04-13T17:16:26.631" v="198" actId="1076"/>
+          <ac:picMkLst>
+            <pc:docMk/>
+            <pc:sldMk cId="4230192189" sldId="259"/>
+            <ac:picMk id="11" creationId="{D48B34F2-88F2-4778-BAC8-014D3C1E9446}"/>
+          </ac:picMkLst>
+        </pc:picChg>
+      </pc:sldChg>
+      <pc:sldChg chg="addSp delSp modSp new mod">
+        <pc:chgData name="Firnaaz Ahamed" userId="354af85a-496a-464c-a30e-ea50a64145d9" providerId="ADAL" clId="{D0B3A3F1-4C1C-48C4-A1DA-EE8A7114DFAF}" dt="2022-04-13T19:51:32.783" v="345" actId="2166"/>
+        <pc:sldMkLst>
+          <pc:docMk/>
+          <pc:sldMk cId="3839747776" sldId="260"/>
+        </pc:sldMkLst>
+        <pc:spChg chg="add del mod">
+          <ac:chgData name="Firnaaz Ahamed" userId="354af85a-496a-464c-a30e-ea50a64145d9" providerId="ADAL" clId="{D0B3A3F1-4C1C-48C4-A1DA-EE8A7114DFAF}" dt="2022-04-13T19:22:39.106" v="214" actId="478"/>
+          <ac:spMkLst>
+            <pc:docMk/>
+            <pc:sldMk cId="3839747776" sldId="260"/>
+            <ac:spMk id="4" creationId="{9AF3DFA7-30DA-4492-B745-EEC8524D27D9}"/>
+          </ac:spMkLst>
+        </pc:spChg>
+        <pc:graphicFrameChg chg="add mod modGraphic">
+          <ac:chgData name="Firnaaz Ahamed" userId="354af85a-496a-464c-a30e-ea50a64145d9" providerId="ADAL" clId="{D0B3A3F1-4C1C-48C4-A1DA-EE8A7114DFAF}" dt="2022-04-13T19:51:32.783" v="345" actId="2166"/>
+          <ac:graphicFrameMkLst>
+            <pc:docMk/>
+            <pc:sldMk cId="3839747776" sldId="260"/>
+            <ac:graphicFrameMk id="5" creationId="{EF8308EB-F605-4FC6-A7E9-09CC22DD105F}"/>
+          </ac:graphicFrameMkLst>
+        </pc:graphicFrameChg>
+        <pc:picChg chg="add del mod">
+          <ac:chgData name="Firnaaz Ahamed" userId="354af85a-496a-464c-a30e-ea50a64145d9" providerId="ADAL" clId="{D0B3A3F1-4C1C-48C4-A1DA-EE8A7114DFAF}" dt="2022-04-13T19:31:55.250" v="338" actId="478"/>
+          <ac:picMkLst>
+            <pc:docMk/>
+            <pc:sldMk cId="3839747776" sldId="260"/>
+            <ac:picMk id="3" creationId="{37151500-A1B5-4CB4-A57B-3DC53B62AE19}"/>
+          </ac:picMkLst>
+        </pc:picChg>
+        <pc:picChg chg="add mod">
+          <ac:chgData name="Firnaaz Ahamed" userId="354af85a-496a-464c-a30e-ea50a64145d9" providerId="ADAL" clId="{D0B3A3F1-4C1C-48C4-A1DA-EE8A7114DFAF}" dt="2022-04-13T19:32:18.041" v="344" actId="1076"/>
+          <ac:picMkLst>
+            <pc:docMk/>
+            <pc:sldMk cId="3839747776" sldId="260"/>
+            <ac:picMk id="7" creationId="{7B9D2B40-94B0-44DA-8FA9-E5508204FD4A}"/>
+          </ac:picMkLst>
+        </pc:picChg>
+      </pc:sldChg>
+    </pc:docChg>
+  </pc:docChgLst>
   <pc:docChgLst>
     <pc:chgData name="Firnaaz Ahamed" userId="354af85a-496a-464c-a30e-ea50a64145d9" providerId="ADAL" clId="{D6AC5A0F-AC28-4C16-82D2-252B3D714B86}"/>
     <pc:docChg chg="modSld">
@@ -337,7 +600,7 @@
           <a:p>
             <a:fld id="{71B810C0-4599-448D-980C-C2D8BCF60C31}" type="datetimeFigureOut">
               <a:rPr lang="en-US" smtClean="0"/>
-              <a:t>3/18/2022</a:t>
+              <a:t>4/13/2022</a:t>
             </a:fld>
             <a:endParaRPr lang="en-US"/>
           </a:p>
@@ -535,7 +798,7 @@
           <a:p>
             <a:fld id="{71B810C0-4599-448D-980C-C2D8BCF60C31}" type="datetimeFigureOut">
               <a:rPr lang="en-US" smtClean="0"/>
-              <a:t>3/18/2022</a:t>
+              <a:t>4/13/2022</a:t>
             </a:fld>
             <a:endParaRPr lang="en-US"/>
           </a:p>
@@ -743,7 +1006,7 @@
           <a:p>
             <a:fld id="{71B810C0-4599-448D-980C-C2D8BCF60C31}" type="datetimeFigureOut">
               <a:rPr lang="en-US" smtClean="0"/>
-              <a:t>3/18/2022</a:t>
+              <a:t>4/13/2022</a:t>
             </a:fld>
             <a:endParaRPr lang="en-US"/>
           </a:p>
@@ -941,7 +1204,7 @@
           <a:p>
             <a:fld id="{71B810C0-4599-448D-980C-C2D8BCF60C31}" type="datetimeFigureOut">
               <a:rPr lang="en-US" smtClean="0"/>
-              <a:t>3/18/2022</a:t>
+              <a:t>4/13/2022</a:t>
             </a:fld>
             <a:endParaRPr lang="en-US"/>
           </a:p>
@@ -1216,7 +1479,7 @@
           <a:p>
             <a:fld id="{71B810C0-4599-448D-980C-C2D8BCF60C31}" type="datetimeFigureOut">
               <a:rPr lang="en-US" smtClean="0"/>
-              <a:t>3/18/2022</a:t>
+              <a:t>4/13/2022</a:t>
             </a:fld>
             <a:endParaRPr lang="en-US"/>
           </a:p>
@@ -1481,7 +1744,7 @@
           <a:p>
             <a:fld id="{71B810C0-4599-448D-980C-C2D8BCF60C31}" type="datetimeFigureOut">
               <a:rPr lang="en-US" smtClean="0"/>
-              <a:t>3/18/2022</a:t>
+              <a:t>4/13/2022</a:t>
             </a:fld>
             <a:endParaRPr lang="en-US"/>
           </a:p>
@@ -1893,7 +2156,7 @@
           <a:p>
             <a:fld id="{71B810C0-4599-448D-980C-C2D8BCF60C31}" type="datetimeFigureOut">
               <a:rPr lang="en-US" smtClean="0"/>
-              <a:t>3/18/2022</a:t>
+              <a:t>4/13/2022</a:t>
             </a:fld>
             <a:endParaRPr lang="en-US"/>
           </a:p>
@@ -2034,7 +2297,7 @@
           <a:p>
             <a:fld id="{71B810C0-4599-448D-980C-C2D8BCF60C31}" type="datetimeFigureOut">
               <a:rPr lang="en-US" smtClean="0"/>
-              <a:t>3/18/2022</a:t>
+              <a:t>4/13/2022</a:t>
             </a:fld>
             <a:endParaRPr lang="en-US"/>
           </a:p>
@@ -2147,7 +2410,7 @@
           <a:p>
             <a:fld id="{71B810C0-4599-448D-980C-C2D8BCF60C31}" type="datetimeFigureOut">
               <a:rPr lang="en-US" smtClean="0"/>
-              <a:t>3/18/2022</a:t>
+              <a:t>4/13/2022</a:t>
             </a:fld>
             <a:endParaRPr lang="en-US"/>
           </a:p>
@@ -2458,7 +2721,7 @@
           <a:p>
             <a:fld id="{71B810C0-4599-448D-980C-C2D8BCF60C31}" type="datetimeFigureOut">
               <a:rPr lang="en-US" smtClean="0"/>
-              <a:t>3/18/2022</a:t>
+              <a:t>4/13/2022</a:t>
             </a:fld>
             <a:endParaRPr lang="en-US"/>
           </a:p>
@@ -2746,7 +3009,7 @@
           <a:p>
             <a:fld id="{71B810C0-4599-448D-980C-C2D8BCF60C31}" type="datetimeFigureOut">
               <a:rPr lang="en-US" smtClean="0"/>
-              <a:t>3/18/2022</a:t>
+              <a:t>4/13/2022</a:t>
             </a:fld>
             <a:endParaRPr lang="en-US"/>
           </a:p>
@@ -2987,7 +3250,7 @@
           <a:p>
             <a:fld id="{71B810C0-4599-448D-980C-C2D8BCF60C31}" type="datetimeFigureOut">
               <a:rPr lang="en-US" smtClean="0"/>
-              <a:t>3/18/2022</a:t>
+              <a:t>4/13/2022</a:t>
             </a:fld>
             <a:endParaRPr lang="en-US"/>
           </a:p>
@@ -3406,10 +3669,10 @@
       </p:grpSpPr>
       <p:pic>
         <p:nvPicPr>
-          <p:cNvPr id="3" name="Picture 2" descr="Chart&#10;&#10;Description automatically generated">
-            <a:extLst>
-              <a:ext uri="{FF2B5EF4-FFF2-40B4-BE49-F238E27FC236}">
-                <a16:creationId xmlns:a16="http://schemas.microsoft.com/office/drawing/2014/main" id="{854B92A7-1E1A-446E-A24C-647BB0037F52}"/>
+          <p:cNvPr id="6" name="Picture 5" descr="Chart, scatter chart&#10;&#10;Description automatically generated">
+            <a:extLst>
+              <a:ext uri="{FF2B5EF4-FFF2-40B4-BE49-F238E27FC236}">
+                <a16:creationId xmlns:a16="http://schemas.microsoft.com/office/drawing/2014/main" id="{3F7C45EF-DDC7-4322-A14E-2CE9BEE1B6A7}"/>
               </a:ext>
             </a:extLst>
           </p:cNvPr>
@@ -3432,8 +3695,393 @@
         </p:blipFill>
         <p:spPr>
           <a:xfrm>
-            <a:off x="2971800" y="347662"/>
-            <a:ext cx="6337300" cy="5580086"/>
+            <a:off x="164656" y="1115681"/>
+            <a:ext cx="4635397" cy="3462669"/>
+          </a:xfrm>
+          <a:prstGeom prst="rect">
+            <a:avLst/>
+          </a:prstGeom>
+        </p:spPr>
+      </p:pic>
+      <p:sp>
+        <p:nvSpPr>
+          <p:cNvPr id="4" name="TextBox 3">
+            <a:extLst>
+              <a:ext uri="{FF2B5EF4-FFF2-40B4-BE49-F238E27FC236}">
+                <a16:creationId xmlns:a16="http://schemas.microsoft.com/office/drawing/2014/main" id="{0CBE1CC4-09BD-43CB-A4FE-D0963FFCD536}"/>
+              </a:ext>
+            </a:extLst>
+          </p:cNvPr>
+          <p:cNvSpPr txBox="1"/>
+          <p:nvPr/>
+        </p:nvSpPr>
+        <p:spPr>
+          <a:xfrm>
+            <a:off x="3333750" y="4952484"/>
+            <a:ext cx="3930650" cy="646331"/>
+          </a:xfrm>
+          <a:prstGeom prst="rect">
+            <a:avLst/>
+          </a:prstGeom>
+          <a:noFill/>
+        </p:spPr>
+        <p:txBody>
+          <a:bodyPr wrap="square">
+            <a:spAutoFit/>
+          </a:bodyPr>
+          <a:lstStyle/>
+          <a:p>
+            <a:r>
+              <a:rPr lang="en-US" dirty="0"/>
+              <a:t>“S19S_0079_Sed_Field_ICR_D_p2” was an outlier, excluded in this figure</a:t>
+            </a:r>
+          </a:p>
+        </p:txBody>
+      </p:sp>
+      <p:sp>
+        <p:nvSpPr>
+          <p:cNvPr id="7" name="TextBox 6">
+            <a:extLst>
+              <a:ext uri="{FF2B5EF4-FFF2-40B4-BE49-F238E27FC236}">
+                <a16:creationId xmlns:a16="http://schemas.microsoft.com/office/drawing/2014/main" id="{D558D364-B7B6-413B-A108-862244962CE7}"/>
+              </a:ext>
+            </a:extLst>
+          </p:cNvPr>
+          <p:cNvSpPr txBox="1"/>
+          <p:nvPr/>
+        </p:nvSpPr>
+        <p:spPr>
+          <a:xfrm>
+            <a:off x="647700" y="611485"/>
+            <a:ext cx="1892300" cy="369332"/>
+          </a:xfrm>
+          <a:prstGeom prst="rect">
+            <a:avLst/>
+          </a:prstGeom>
+          <a:noFill/>
+        </p:spPr>
+        <p:txBody>
+          <a:bodyPr wrap="square">
+            <a:spAutoFit/>
+          </a:bodyPr>
+          <a:lstStyle/>
+          <a:p>
+            <a:r>
+              <a:rPr lang="en-US" dirty="0"/>
+              <a:t>Lambda </a:t>
+            </a:r>
+          </a:p>
+        </p:txBody>
+      </p:sp>
+      <p:pic>
+        <p:nvPicPr>
+          <p:cNvPr id="5" name="Picture 4" descr="Chart, scatter chart&#10;&#10;Description automatically generated">
+            <a:extLst>
+              <a:ext uri="{FF2B5EF4-FFF2-40B4-BE49-F238E27FC236}">
+                <a16:creationId xmlns:a16="http://schemas.microsoft.com/office/drawing/2014/main" id="{F302EABB-32B8-429C-A4D2-D0654BBDB0B6}"/>
+              </a:ext>
+            </a:extLst>
+          </p:cNvPr>
+          <p:cNvPicPr>
+            <a:picLocks noChangeAspect="1"/>
+          </p:cNvPicPr>
+          <p:nvPr/>
+        </p:nvPicPr>
+        <p:blipFill>
+          <a:blip r:embed="rId3">
+            <a:extLst>
+              <a:ext uri="{28A0092B-C50C-407E-A947-70E740481C1C}">
+                <a14:useLocalDpi xmlns:a14="http://schemas.microsoft.com/office/drawing/2010/main" val="0"/>
+              </a:ext>
+            </a:extLst>
+          </a:blip>
+          <a:stretch>
+            <a:fillRect/>
+          </a:stretch>
+        </p:blipFill>
+        <p:spPr>
+          <a:xfrm>
+            <a:off x="5360468" y="980817"/>
+            <a:ext cx="4868347" cy="3553083"/>
+          </a:xfrm>
+          <a:prstGeom prst="rect">
+            <a:avLst/>
+          </a:prstGeom>
+        </p:spPr>
+      </p:pic>
+      <p:sp>
+        <p:nvSpPr>
+          <p:cNvPr id="8" name="TextBox 7">
+            <a:extLst>
+              <a:ext uri="{FF2B5EF4-FFF2-40B4-BE49-F238E27FC236}">
+                <a16:creationId xmlns:a16="http://schemas.microsoft.com/office/drawing/2014/main" id="{B5B1E913-809A-4519-93D2-31EF6FEE5918}"/>
+              </a:ext>
+            </a:extLst>
+          </p:cNvPr>
+          <p:cNvSpPr txBox="1"/>
+          <p:nvPr/>
+        </p:nvSpPr>
+        <p:spPr>
+          <a:xfrm>
+            <a:off x="6369050" y="547985"/>
+            <a:ext cx="1892300" cy="369332"/>
+          </a:xfrm>
+          <a:prstGeom prst="rect">
+            <a:avLst/>
+          </a:prstGeom>
+          <a:noFill/>
+        </p:spPr>
+        <p:txBody>
+          <a:bodyPr wrap="square">
+            <a:spAutoFit/>
+          </a:bodyPr>
+          <a:lstStyle/>
+          <a:p>
+            <a:r>
+              <a:rPr lang="en-US" dirty="0" err="1"/>
+              <a:t>delGcox</a:t>
+            </a:r>
+            <a:endParaRPr lang="en-US" dirty="0"/>
+          </a:p>
+        </p:txBody>
+      </p:sp>
+      <p:sp>
+        <p:nvSpPr>
+          <p:cNvPr id="9" name="TextBox 8">
+            <a:extLst>
+              <a:ext uri="{FF2B5EF4-FFF2-40B4-BE49-F238E27FC236}">
+                <a16:creationId xmlns:a16="http://schemas.microsoft.com/office/drawing/2014/main" id="{85C91981-72A9-4518-8CA0-98402A8E59F8}"/>
+              </a:ext>
+            </a:extLst>
+          </p:cNvPr>
+          <p:cNvSpPr txBox="1"/>
+          <p:nvPr/>
+        </p:nvSpPr>
+        <p:spPr>
+          <a:xfrm>
+            <a:off x="3784600" y="88384"/>
+            <a:ext cx="825500" cy="369332"/>
+          </a:xfrm>
+          <a:prstGeom prst="rect">
+            <a:avLst/>
+          </a:prstGeom>
+          <a:noFill/>
+        </p:spPr>
+        <p:txBody>
+          <a:bodyPr wrap="square">
+            <a:spAutoFit/>
+          </a:bodyPr>
+          <a:lstStyle/>
+          <a:p>
+            <a:r>
+              <a:rPr lang="en-US" dirty="0"/>
+              <a:t>pH = 7</a:t>
+            </a:r>
+          </a:p>
+        </p:txBody>
+      </p:sp>
+    </p:spTree>
+    <p:extLst>
+      <p:ext uri="{BB962C8B-B14F-4D97-AF65-F5344CB8AC3E}">
+        <p14:creationId xmlns:p14="http://schemas.microsoft.com/office/powerpoint/2010/main" val="1258212438"/>
+      </p:ext>
+    </p:extLst>
+  </p:cSld>
+  <p:clrMapOvr>
+    <a:masterClrMapping/>
+  </p:clrMapOvr>
+</p:sld>
+</file>
+
+<file path=ppt/slides/slide2.xml><?xml version="1.0" encoding="utf-8"?>
+<p:sld xmlns:a="http://schemas.openxmlformats.org/drawingml/2006/main" xmlns:r="http://schemas.openxmlformats.org/officeDocument/2006/relationships" xmlns:p="http://schemas.openxmlformats.org/presentationml/2006/main">
+  <p:cSld>
+    <p:spTree>
+      <p:nvGrpSpPr>
+        <p:cNvPr id="1" name=""/>
+        <p:cNvGrpSpPr/>
+        <p:nvPr/>
+      </p:nvGrpSpPr>
+      <p:grpSpPr>
+        <a:xfrm>
+          <a:off x="0" y="0"/>
+          <a:ext cx="0" cy="0"/>
+          <a:chOff x="0" y="0"/>
+          <a:chExt cx="0" cy="0"/>
+        </a:xfrm>
+      </p:grpSpPr>
+      <p:pic>
+        <p:nvPicPr>
+          <p:cNvPr id="5" name="Picture 4" descr="Chart, bubble chart&#10;&#10;Description automatically generated">
+            <a:extLst>
+              <a:ext uri="{FF2B5EF4-FFF2-40B4-BE49-F238E27FC236}">
+                <a16:creationId xmlns:a16="http://schemas.microsoft.com/office/drawing/2014/main" id="{446B9B14-3049-49AB-804F-689A0AEC5823}"/>
+              </a:ext>
+            </a:extLst>
+          </p:cNvPr>
+          <p:cNvPicPr>
+            <a:picLocks noChangeAspect="1"/>
+          </p:cNvPicPr>
+          <p:nvPr/>
+        </p:nvPicPr>
+        <p:blipFill>
+          <a:blip r:embed="rId2">
+            <a:extLst>
+              <a:ext uri="{28A0092B-C50C-407E-A947-70E740481C1C}">
+                <a14:useLocalDpi xmlns:a14="http://schemas.microsoft.com/office/drawing/2010/main" val="0"/>
+              </a:ext>
+            </a:extLst>
+          </a:blip>
+          <a:stretch>
+            <a:fillRect/>
+          </a:stretch>
+        </p:blipFill>
+        <p:spPr>
+          <a:xfrm>
+            <a:off x="6947969" y="1963548"/>
+            <a:ext cx="4565906" cy="3332352"/>
+          </a:xfrm>
+          <a:prstGeom prst="rect">
+            <a:avLst/>
+          </a:prstGeom>
+        </p:spPr>
+      </p:pic>
+      <p:sp>
+        <p:nvSpPr>
+          <p:cNvPr id="8" name="TextBox 7">
+            <a:extLst>
+              <a:ext uri="{FF2B5EF4-FFF2-40B4-BE49-F238E27FC236}">
+                <a16:creationId xmlns:a16="http://schemas.microsoft.com/office/drawing/2014/main" id="{107494D4-EDD0-41BB-8B40-E84A2E5B83FF}"/>
+              </a:ext>
+            </a:extLst>
+          </p:cNvPr>
+          <p:cNvSpPr txBox="1"/>
+          <p:nvPr/>
+        </p:nvSpPr>
+        <p:spPr>
+          <a:xfrm>
+            <a:off x="3784600" y="88384"/>
+            <a:ext cx="3975100" cy="369332"/>
+          </a:xfrm>
+          <a:prstGeom prst="rect">
+            <a:avLst/>
+          </a:prstGeom>
+          <a:noFill/>
+        </p:spPr>
+        <p:txBody>
+          <a:bodyPr wrap="square">
+            <a:spAutoFit/>
+          </a:bodyPr>
+          <a:lstStyle/>
+          <a:p>
+            <a:r>
+              <a:rPr lang="en-US" dirty="0"/>
+              <a:t>Sample-specific pH</a:t>
+            </a:r>
+          </a:p>
+        </p:txBody>
+      </p:sp>
+      <p:sp>
+        <p:nvSpPr>
+          <p:cNvPr id="9" name="TextBox 8">
+            <a:extLst>
+              <a:ext uri="{FF2B5EF4-FFF2-40B4-BE49-F238E27FC236}">
+                <a16:creationId xmlns:a16="http://schemas.microsoft.com/office/drawing/2014/main" id="{E1B332DC-B978-4BEC-B49E-AE4FB991C836}"/>
+              </a:ext>
+            </a:extLst>
+          </p:cNvPr>
+          <p:cNvSpPr txBox="1"/>
+          <p:nvPr/>
+        </p:nvSpPr>
+        <p:spPr>
+          <a:xfrm>
+            <a:off x="654050" y="1192768"/>
+            <a:ext cx="1892300" cy="369332"/>
+          </a:xfrm>
+          <a:prstGeom prst="rect">
+            <a:avLst/>
+          </a:prstGeom>
+          <a:noFill/>
+        </p:spPr>
+        <p:txBody>
+          <a:bodyPr wrap="square">
+            <a:spAutoFit/>
+          </a:bodyPr>
+          <a:lstStyle/>
+          <a:p>
+            <a:r>
+              <a:rPr lang="en-US" dirty="0"/>
+              <a:t>Lambda </a:t>
+            </a:r>
+          </a:p>
+        </p:txBody>
+      </p:sp>
+      <p:sp>
+        <p:nvSpPr>
+          <p:cNvPr id="10" name="TextBox 9">
+            <a:extLst>
+              <a:ext uri="{FF2B5EF4-FFF2-40B4-BE49-F238E27FC236}">
+                <a16:creationId xmlns:a16="http://schemas.microsoft.com/office/drawing/2014/main" id="{E481DD45-42F4-45C9-9E1C-BA4DB9E6C3AB}"/>
+              </a:ext>
+            </a:extLst>
+          </p:cNvPr>
+          <p:cNvSpPr txBox="1"/>
+          <p:nvPr/>
+        </p:nvSpPr>
+        <p:spPr>
+          <a:xfrm>
+            <a:off x="7689850" y="1377434"/>
+            <a:ext cx="1892300" cy="369332"/>
+          </a:xfrm>
+          <a:prstGeom prst="rect">
+            <a:avLst/>
+          </a:prstGeom>
+          <a:noFill/>
+        </p:spPr>
+        <p:txBody>
+          <a:bodyPr wrap="square">
+            <a:spAutoFit/>
+          </a:bodyPr>
+          <a:lstStyle/>
+          <a:p>
+            <a:r>
+              <a:rPr lang="en-US" dirty="0" err="1"/>
+              <a:t>delGcox</a:t>
+            </a:r>
+            <a:endParaRPr lang="en-US" dirty="0"/>
+          </a:p>
+        </p:txBody>
+      </p:sp>
+      <p:pic>
+        <p:nvPicPr>
+          <p:cNvPr id="11" name="Picture 10" descr="Chart, scatter chart, bubble chart&#10;&#10;Description automatically generated">
+            <a:extLst>
+              <a:ext uri="{FF2B5EF4-FFF2-40B4-BE49-F238E27FC236}">
+                <a16:creationId xmlns:a16="http://schemas.microsoft.com/office/drawing/2014/main" id="{D48B34F2-88F2-4778-BAC8-014D3C1E9446}"/>
+              </a:ext>
+            </a:extLst>
+          </p:cNvPr>
+          <p:cNvPicPr>
+            <a:picLocks noChangeAspect="1"/>
+          </p:cNvPicPr>
+          <p:nvPr/>
+        </p:nvPicPr>
+        <p:blipFill>
+          <a:blip r:embed="rId3">
+            <a:extLst>
+              <a:ext uri="{28A0092B-C50C-407E-A947-70E740481C1C}">
+                <a14:useLocalDpi xmlns:a14="http://schemas.microsoft.com/office/drawing/2010/main" val="0"/>
+              </a:ext>
+            </a:extLst>
+          </a:blip>
+          <a:stretch>
+            <a:fillRect/>
+          </a:stretch>
+        </p:blipFill>
+        <p:spPr>
+          <a:xfrm>
+            <a:off x="411722" y="1674578"/>
+            <a:ext cx="5665805" cy="4135095"/>
           </a:xfrm>
           <a:prstGeom prst="rect">
             <a:avLst/>
@@ -3443,7 +4091,407 @@
     </p:spTree>
     <p:extLst>
       <p:ext uri="{BB962C8B-B14F-4D97-AF65-F5344CB8AC3E}">
-        <p14:creationId xmlns:p14="http://schemas.microsoft.com/office/powerpoint/2010/main" val="1258212438"/>
+        <p14:creationId xmlns:p14="http://schemas.microsoft.com/office/powerpoint/2010/main" val="4230192189"/>
+      </p:ext>
+    </p:extLst>
+  </p:cSld>
+  <p:clrMapOvr>
+    <a:masterClrMapping/>
+  </p:clrMapOvr>
+</p:sld>
+</file>
+
+<file path=ppt/slides/slide3.xml><?xml version="1.0" encoding="utf-8"?>
+<p:sld xmlns:a="http://schemas.openxmlformats.org/drawingml/2006/main" xmlns:r="http://schemas.openxmlformats.org/officeDocument/2006/relationships" xmlns:p="http://schemas.openxmlformats.org/presentationml/2006/main">
+  <p:cSld>
+    <p:spTree>
+      <p:nvGrpSpPr>
+        <p:cNvPr id="1" name=""/>
+        <p:cNvGrpSpPr/>
+        <p:nvPr/>
+      </p:nvGrpSpPr>
+      <p:grpSpPr>
+        <a:xfrm>
+          <a:off x="0" y="0"/>
+          <a:ext cx="0" cy="0"/>
+          <a:chOff x="0" y="0"/>
+          <a:chExt cx="0" cy="0"/>
+        </a:xfrm>
+      </p:grpSpPr>
+      <p:graphicFrame>
+        <p:nvGraphicFramePr>
+          <p:cNvPr id="5" name="Table 5">
+            <a:extLst>
+              <a:ext uri="{FF2B5EF4-FFF2-40B4-BE49-F238E27FC236}">
+                <a16:creationId xmlns:a16="http://schemas.microsoft.com/office/drawing/2014/main" id="{EF8308EB-F605-4FC6-A7E9-09CC22DD105F}"/>
+              </a:ext>
+            </a:extLst>
+          </p:cNvPr>
+          <p:cNvGraphicFramePr>
+            <a:graphicFrameLocks noGrp="1"/>
+          </p:cNvGraphicFramePr>
+          <p:nvPr>
+            <p:extLst>
+              <p:ext uri="{D42A27DB-BD31-4B8C-83A1-F6EECF244321}">
+                <p14:modId xmlns:p14="http://schemas.microsoft.com/office/powerpoint/2010/main" val="2812445749"/>
+              </p:ext>
+            </p:extLst>
+          </p:nvPr>
+        </p:nvGraphicFramePr>
+        <p:xfrm>
+          <a:off x="7188200" y="3071564"/>
+          <a:ext cx="3286125" cy="829734"/>
+        </p:xfrm>
+        <a:graphic>
+          <a:graphicData uri="http://schemas.openxmlformats.org/drawingml/2006/table">
+            <a:tbl>
+              <a:tblPr firstRow="1" bandRow="1">
+                <a:tableStyleId>{5C22544A-7EE6-4342-B048-85BDC9FD1C3A}</a:tableStyleId>
+              </a:tblPr>
+              <a:tblGrid>
+                <a:gridCol w="1095375">
+                  <a:extLst>
+                    <a:ext uri="{9D8B030D-6E8A-4147-A177-3AD203B41FA5}">
+                      <a16:colId xmlns:a16="http://schemas.microsoft.com/office/drawing/2014/main" val="2081658"/>
+                    </a:ext>
+                  </a:extLst>
+                </a:gridCol>
+                <a:gridCol w="1095375">
+                  <a:extLst>
+                    <a:ext uri="{9D8B030D-6E8A-4147-A177-3AD203B41FA5}">
+                      <a16:colId xmlns:a16="http://schemas.microsoft.com/office/drawing/2014/main" val="1186040450"/>
+                    </a:ext>
+                  </a:extLst>
+                </a:gridCol>
+                <a:gridCol w="1095375">
+                  <a:extLst>
+                    <a:ext uri="{9D8B030D-6E8A-4147-A177-3AD203B41FA5}">
+                      <a16:colId xmlns:a16="http://schemas.microsoft.com/office/drawing/2014/main" val="726898367"/>
+                    </a:ext>
+                  </a:extLst>
+                </a:gridCol>
+              </a:tblGrid>
+              <a:tr h="276578">
+                <a:tc>
+                  <a:txBody>
+                    <a:bodyPr/>
+                    <a:lstStyle/>
+                    <a:p>
+                      <a:pPr algn="ctr"/>
+                      <a:endParaRPr lang="en-US" sz="1100" dirty="0"/>
+                    </a:p>
+                  </a:txBody>
+                  <a:tcPr/>
+                </a:tc>
+                <a:tc>
+                  <a:txBody>
+                    <a:bodyPr/>
+                    <a:lstStyle/>
+                    <a:p>
+                      <a:pPr algn="ctr"/>
+                      <a:r>
+                        <a:rPr lang="en-US" sz="1100" dirty="0"/>
+                        <a:t>Low limitation</a:t>
+                      </a:r>
+                    </a:p>
+                  </a:txBody>
+                  <a:tcPr/>
+                </a:tc>
+                <a:tc>
+                  <a:txBody>
+                    <a:bodyPr/>
+                    <a:lstStyle/>
+                    <a:p>
+                      <a:pPr algn="ctr"/>
+                      <a:r>
+                        <a:rPr lang="en-US" sz="1100" dirty="0"/>
+                        <a:t>High limitation</a:t>
+                      </a:r>
+                    </a:p>
+                  </a:txBody>
+                  <a:tcPr/>
+                </a:tc>
+                <a:extLst>
+                  <a:ext uri="{0D108BD9-81ED-4DB2-BD59-A6C34878D82A}">
+                    <a16:rowId xmlns:a16="http://schemas.microsoft.com/office/drawing/2014/main" val="3993123338"/>
+                  </a:ext>
+                </a:extLst>
+              </a:tr>
+              <a:tr h="276578">
+                <a:tc>
+                  <a:txBody>
+                    <a:bodyPr/>
+                    <a:lstStyle/>
+                    <a:p>
+                      <a:pPr algn="ctr"/>
+                      <a:r>
+                        <a:rPr lang="en-US" sz="1100" dirty="0" err="1"/>
+                        <a:t>VhOC</a:t>
+                      </a:r>
+                      <a:endParaRPr lang="en-US" sz="1100" dirty="0"/>
+                    </a:p>
+                  </a:txBody>
+                  <a:tcPr/>
+                </a:tc>
+                <a:tc>
+                  <a:txBody>
+                    <a:bodyPr/>
+                    <a:lstStyle/>
+                    <a:p>
+                      <a:pPr algn="ctr"/>
+                      <a:r>
+                        <a:rPr lang="en-US" sz="1100" dirty="0"/>
+                        <a:t>2</a:t>
+                      </a:r>
+                    </a:p>
+                  </a:txBody>
+                  <a:tcPr/>
+                </a:tc>
+                <a:tc>
+                  <a:txBody>
+                    <a:bodyPr/>
+                    <a:lstStyle/>
+                    <a:p>
+                      <a:pPr algn="ctr"/>
+                      <a:r>
+                        <a:rPr lang="en-US" sz="1100" dirty="0"/>
+                        <a:t>0.05</a:t>
+                      </a:r>
+                    </a:p>
+                  </a:txBody>
+                  <a:tcPr/>
+                </a:tc>
+                <a:extLst>
+                  <a:ext uri="{0D108BD9-81ED-4DB2-BD59-A6C34878D82A}">
+                    <a16:rowId xmlns:a16="http://schemas.microsoft.com/office/drawing/2014/main" val="1176474019"/>
+                  </a:ext>
+                </a:extLst>
+              </a:tr>
+              <a:tr h="276578">
+                <a:tc>
+                  <a:txBody>
+                    <a:bodyPr/>
+                    <a:lstStyle/>
+                    <a:p>
+                      <a:pPr algn="ctr"/>
+                      <a:r>
+                        <a:rPr lang="en-US" sz="1100" dirty="0"/>
+                        <a:t>VhO2</a:t>
+                      </a:r>
+                    </a:p>
+                  </a:txBody>
+                  <a:tcPr/>
+                </a:tc>
+                <a:tc>
+                  <a:txBody>
+                    <a:bodyPr/>
+                    <a:lstStyle/>
+                    <a:p>
+                      <a:pPr algn="ctr"/>
+                      <a:r>
+                        <a:rPr lang="en-US" sz="1100" dirty="0"/>
+                        <a:t>10</a:t>
+                      </a:r>
+                    </a:p>
+                  </a:txBody>
+                  <a:tcPr/>
+                </a:tc>
+                <a:tc>
+                  <a:txBody>
+                    <a:bodyPr/>
+                    <a:lstStyle/>
+                    <a:p>
+                      <a:pPr algn="ctr"/>
+                      <a:r>
+                        <a:rPr lang="en-US" sz="1100" dirty="0"/>
+                        <a:t>0.5</a:t>
+                      </a:r>
+                    </a:p>
+                  </a:txBody>
+                  <a:tcPr/>
+                </a:tc>
+                <a:extLst>
+                  <a:ext uri="{0D108BD9-81ED-4DB2-BD59-A6C34878D82A}">
+                    <a16:rowId xmlns:a16="http://schemas.microsoft.com/office/drawing/2014/main" val="755496940"/>
+                  </a:ext>
+                </a:extLst>
+              </a:tr>
+            </a:tbl>
+          </a:graphicData>
+        </a:graphic>
+      </p:graphicFrame>
+      <p:pic>
+        <p:nvPicPr>
+          <p:cNvPr id="7" name="Picture 6" descr="Chart, surface chart&#10;&#10;Description automatically generated">
+            <a:extLst>
+              <a:ext uri="{FF2B5EF4-FFF2-40B4-BE49-F238E27FC236}">
+                <a16:creationId xmlns:a16="http://schemas.microsoft.com/office/drawing/2014/main" id="{7B9D2B40-94B0-44DA-8FA9-E5508204FD4A}"/>
+              </a:ext>
+            </a:extLst>
+          </p:cNvPr>
+          <p:cNvPicPr>
+            <a:picLocks noChangeAspect="1"/>
+          </p:cNvPicPr>
+          <p:nvPr/>
+        </p:nvPicPr>
+        <p:blipFill>
+          <a:blip r:embed="rId2">
+            <a:extLst>
+              <a:ext uri="{28A0092B-C50C-407E-A947-70E740481C1C}">
+                <a14:useLocalDpi xmlns:a14="http://schemas.microsoft.com/office/drawing/2010/main" val="0"/>
+              </a:ext>
+            </a:extLst>
+          </a:blip>
+          <a:stretch>
+            <a:fillRect/>
+          </a:stretch>
+        </p:blipFill>
+        <p:spPr>
+          <a:xfrm>
+            <a:off x="298783" y="698750"/>
+            <a:ext cx="6722200" cy="5041650"/>
+          </a:xfrm>
+          <a:prstGeom prst="rect">
+            <a:avLst/>
+          </a:prstGeom>
+        </p:spPr>
+      </p:pic>
+    </p:spTree>
+    <p:extLst>
+      <p:ext uri="{BB962C8B-B14F-4D97-AF65-F5344CB8AC3E}">
+        <p14:creationId xmlns:p14="http://schemas.microsoft.com/office/powerpoint/2010/main" val="3839747776"/>
+      </p:ext>
+    </p:extLst>
+  </p:cSld>
+  <p:clrMapOvr>
+    <a:masterClrMapping/>
+  </p:clrMapOvr>
+</p:sld>
+</file>
+
+<file path=ppt/slides/slide4.xml><?xml version="1.0" encoding="utf-8"?>
+<p:sld xmlns:a="http://schemas.openxmlformats.org/drawingml/2006/main" xmlns:r="http://schemas.openxmlformats.org/officeDocument/2006/relationships" xmlns:p="http://schemas.openxmlformats.org/presentationml/2006/main">
+  <p:cSld>
+    <p:spTree>
+      <p:nvGrpSpPr>
+        <p:cNvPr id="1" name=""/>
+        <p:cNvGrpSpPr/>
+        <p:nvPr/>
+      </p:nvGrpSpPr>
+      <p:grpSpPr>
+        <a:xfrm>
+          <a:off x="0" y="0"/>
+          <a:ext cx="0" cy="0"/>
+          <a:chOff x="0" y="0"/>
+          <a:chExt cx="0" cy="0"/>
+        </a:xfrm>
+      </p:grpSpPr>
+      <p:pic>
+        <p:nvPicPr>
+          <p:cNvPr id="3" name="Picture 2" descr="Chart, histogram&#10;&#10;Description automatically generated">
+            <a:extLst>
+              <a:ext uri="{FF2B5EF4-FFF2-40B4-BE49-F238E27FC236}">
+                <a16:creationId xmlns:a16="http://schemas.microsoft.com/office/drawing/2014/main" id="{DA92C271-BD18-4E0C-91E8-0DD8733B095E}"/>
+              </a:ext>
+            </a:extLst>
+          </p:cNvPr>
+          <p:cNvPicPr>
+            <a:picLocks noChangeAspect="1"/>
+          </p:cNvPicPr>
+          <p:nvPr/>
+        </p:nvPicPr>
+        <p:blipFill>
+          <a:blip r:embed="rId2">
+            <a:extLst>
+              <a:ext uri="{28A0092B-C50C-407E-A947-70E740481C1C}">
+                <a14:useLocalDpi xmlns:a14="http://schemas.microsoft.com/office/drawing/2010/main" val="0"/>
+              </a:ext>
+            </a:extLst>
+          </a:blip>
+          <a:stretch>
+            <a:fillRect/>
+          </a:stretch>
+        </p:blipFill>
+        <p:spPr>
+          <a:xfrm>
+            <a:off x="2134095" y="1429000"/>
+            <a:ext cx="7923809" cy="4000000"/>
+          </a:xfrm>
+          <a:prstGeom prst="rect">
+            <a:avLst/>
+          </a:prstGeom>
+        </p:spPr>
+      </p:pic>
+    </p:spTree>
+    <p:extLst>
+      <p:ext uri="{BB962C8B-B14F-4D97-AF65-F5344CB8AC3E}">
+        <p14:creationId xmlns:p14="http://schemas.microsoft.com/office/powerpoint/2010/main" val="2989943056"/>
+      </p:ext>
+    </p:extLst>
+  </p:cSld>
+  <p:clrMapOvr>
+    <a:masterClrMapping/>
+  </p:clrMapOvr>
+</p:sld>
+</file>
+
+<file path=ppt/slides/slide5.xml><?xml version="1.0" encoding="utf-8"?>
+<p:sld xmlns:a="http://schemas.openxmlformats.org/drawingml/2006/main" xmlns:r="http://schemas.openxmlformats.org/officeDocument/2006/relationships" xmlns:p="http://schemas.openxmlformats.org/presentationml/2006/main">
+  <p:cSld>
+    <p:spTree>
+      <p:nvGrpSpPr>
+        <p:cNvPr id="1" name=""/>
+        <p:cNvGrpSpPr/>
+        <p:nvPr/>
+      </p:nvGrpSpPr>
+      <p:grpSpPr>
+        <a:xfrm>
+          <a:off x="0" y="0"/>
+          <a:ext cx="0" cy="0"/>
+          <a:chOff x="0" y="0"/>
+          <a:chExt cx="0" cy="0"/>
+        </a:xfrm>
+      </p:grpSpPr>
+      <p:pic>
+        <p:nvPicPr>
+          <p:cNvPr id="5" name="Picture 4" descr="Chart&#10;&#10;Description automatically generated">
+            <a:extLst>
+              <a:ext uri="{FF2B5EF4-FFF2-40B4-BE49-F238E27FC236}">
+                <a16:creationId xmlns:a16="http://schemas.microsoft.com/office/drawing/2014/main" id="{003ADA69-EB9E-4B24-9C15-E076582A8C00}"/>
+              </a:ext>
+            </a:extLst>
+          </p:cNvPr>
+          <p:cNvPicPr>
+            <a:picLocks noChangeAspect="1"/>
+          </p:cNvPicPr>
+          <p:nvPr/>
+        </p:nvPicPr>
+        <p:blipFill>
+          <a:blip r:embed="rId2">
+            <a:extLst>
+              <a:ext uri="{28A0092B-C50C-407E-A947-70E740481C1C}">
+                <a14:useLocalDpi xmlns:a14="http://schemas.microsoft.com/office/drawing/2010/main" val="0"/>
+              </a:ext>
+            </a:extLst>
+          </a:blip>
+          <a:stretch>
+            <a:fillRect/>
+          </a:stretch>
+        </p:blipFill>
+        <p:spPr>
+          <a:xfrm>
+            <a:off x="2134095" y="1429000"/>
+            <a:ext cx="7923809" cy="4000000"/>
+          </a:xfrm>
+          <a:prstGeom prst="rect">
+            <a:avLst/>
+          </a:prstGeom>
+        </p:spPr>
+      </p:pic>
+    </p:spTree>
+    <p:extLst>
+      <p:ext uri="{BB962C8B-B14F-4D97-AF65-F5344CB8AC3E}">
+        <p14:creationId xmlns:p14="http://schemas.microsoft.com/office/powerpoint/2010/main" val="354323073"/>
       </p:ext>
     </p:extLst>
   </p:cSld>

</xml_diff>